<commit_message>
tisasrec incorparate time features
</commit_message>
<xml_diff>
--- a/week6/Dissertation_6.pptx
+++ b/week6/Dissertation_6.pptx
@@ -203,7 +203,7 @@
           <a:p>
             <a:fld id="{5551B73A-00A5-41F0-AD1E-E8BC06CD57C4}" type="datetimeFigureOut">
               <a:rPr lang="zh-CN" altLang="en-US" smtClean="0"/>
-              <a:t>2023/7/10</a:t>
+              <a:t>2023/7/11</a:t>
             </a:fld>
             <a:endParaRPr lang="zh-CN" altLang="en-US"/>
           </a:p>
@@ -4060,7 +4060,7 @@
           <a:p>
             <a:r>
               <a:rPr lang="en-US" dirty="0"/>
-              <a:t>Week5. </a:t>
+              <a:t>Week6. </a:t>
             </a:r>
             <a:br>
               <a:rPr lang="en-US" dirty="0"/>
@@ -4980,7 +4980,7 @@
         </p:nvSpPr>
         <p:spPr>
           <a:xfrm>
-            <a:off x="106062" y="2185822"/>
+            <a:off x="0" y="2190956"/>
             <a:ext cx="10515600" cy="1325563"/>
           </a:xfrm>
         </p:spPr>
@@ -5006,7 +5006,7 @@
             </a:br>
             <a:r>
               <a:rPr lang="en-US" altLang="zh-CN" dirty="0"/>
-              <a:t>(ML-20M)</a:t>
+              <a:t>(ML-20M split by time)</a:t>
             </a:r>
             <a:endParaRPr lang="zh-CN" altLang="en-US" dirty="0"/>
           </a:p>
@@ -5513,7 +5513,7 @@
         <p:spPr>
           <a:xfrm>
             <a:off x="286772" y="1296626"/>
-            <a:ext cx="9241156" cy="4154984"/>
+            <a:ext cx="9241156" cy="4524315"/>
           </a:xfrm>
           <a:prstGeom prst="rect">
             <a:avLst/>
@@ -5709,7 +5709,51 @@
                 <a:ea typeface="Calibri" panose="020F0502020204030204" pitchFamily="34" charset="0"/>
                 <a:cs typeface="Calibri" panose="020F0502020204030204" pitchFamily="34" charset="0"/>
               </a:rPr>
-              <a:t> as batch size before, but  this will cause memory error using time features. Currently </a:t>
+              <a:t> as batch size </a:t>
+            </a:r>
+            <a:r>
+              <a:rPr lang="en-US" altLang="zh-CN" sz="2400" dirty="0">
+                <a:solidFill>
+                  <a:srgbClr val="C00000"/>
+                </a:solidFill>
+                <a:latin typeface="Calibri" panose="020F0502020204030204" pitchFamily="34" charset="0"/>
+                <a:ea typeface="Calibri" panose="020F0502020204030204" pitchFamily="34" charset="0"/>
+                <a:cs typeface="Calibri" panose="020F0502020204030204" pitchFamily="34" charset="0"/>
+              </a:rPr>
+              <a:t>200</a:t>
+            </a:r>
+            <a:r>
+              <a:rPr lang="en-US" altLang="zh-CN" sz="2400" dirty="0">
+                <a:solidFill>
+                  <a:srgbClr val="1F2328"/>
+                </a:solidFill>
+                <a:latin typeface="Calibri" panose="020F0502020204030204" pitchFamily="34" charset="0"/>
+                <a:ea typeface="Calibri" panose="020F0502020204030204" pitchFamily="34" charset="0"/>
+                <a:cs typeface="Calibri" panose="020F0502020204030204" pitchFamily="34" charset="0"/>
+              </a:rPr>
+              <a:t> as </a:t>
+            </a:r>
+            <a:r>
+              <a:rPr lang="en-US" altLang="zh-CN" sz="2400" dirty="0" err="1">
+                <a:solidFill>
+                  <a:srgbClr val="1F2328"/>
+                </a:solidFill>
+                <a:latin typeface="Calibri" panose="020F0502020204030204" pitchFamily="34" charset="0"/>
+                <a:ea typeface="Calibri" panose="020F0502020204030204" pitchFamily="34" charset="0"/>
+                <a:cs typeface="Calibri" panose="020F0502020204030204" pitchFamily="34" charset="0"/>
+              </a:rPr>
+              <a:t>maxlen</a:t>
+            </a:r>
+            <a:r>
+              <a:rPr lang="en-US" altLang="zh-CN" sz="2400" dirty="0">
+                <a:solidFill>
+                  <a:srgbClr val="1F2328"/>
+                </a:solidFill>
+                <a:latin typeface="Calibri" panose="020F0502020204030204" pitchFamily="34" charset="0"/>
+                <a:ea typeface="Calibri" panose="020F0502020204030204" pitchFamily="34" charset="0"/>
+                <a:cs typeface="Calibri" panose="020F0502020204030204" pitchFamily="34" charset="0"/>
+              </a:rPr>
+              <a:t> before, but  this will cause memory error using time features. Currently </a:t>
             </a:r>
             <a:r>
               <a:rPr lang="en-US" altLang="zh-CN" sz="2400" dirty="0">
@@ -5731,7 +5775,62 @@
                 <a:ea typeface="Calibri" panose="020F0502020204030204" pitchFamily="34" charset="0"/>
                 <a:cs typeface="Calibri" panose="020F0502020204030204" pitchFamily="34" charset="0"/>
               </a:rPr>
-              <a:t> as batch size.</a:t>
+              <a:t> as batch size and</a:t>
+            </a:r>
+            <a:r>
+              <a:rPr lang="en-US" altLang="zh-CN" sz="2400" dirty="0">
+                <a:solidFill>
+                  <a:srgbClr val="FF0000"/>
+                </a:solidFill>
+                <a:latin typeface="Calibri" panose="020F0502020204030204" pitchFamily="34" charset="0"/>
+                <a:ea typeface="Calibri" panose="020F0502020204030204" pitchFamily="34" charset="0"/>
+                <a:cs typeface="Calibri" panose="020F0502020204030204" pitchFamily="34" charset="0"/>
+              </a:rPr>
+              <a:t> </a:t>
+            </a:r>
+            <a:r>
+              <a:rPr lang="en-US" altLang="zh-CN" sz="2400" dirty="0">
+                <a:solidFill>
+                  <a:srgbClr val="C00000"/>
+                </a:solidFill>
+                <a:latin typeface="Calibri" panose="020F0502020204030204" pitchFamily="34" charset="0"/>
+                <a:ea typeface="Calibri" panose="020F0502020204030204" pitchFamily="34" charset="0"/>
+                <a:cs typeface="Calibri" panose="020F0502020204030204" pitchFamily="34" charset="0"/>
+              </a:rPr>
+              <a:t>50</a:t>
+            </a:r>
+            <a:r>
+              <a:rPr lang="en-US" altLang="zh-CN" sz="2400" dirty="0">
+                <a:solidFill>
+                  <a:srgbClr val="FF0000"/>
+                </a:solidFill>
+                <a:latin typeface="Calibri" panose="020F0502020204030204" pitchFamily="34" charset="0"/>
+                <a:ea typeface="Calibri" panose="020F0502020204030204" pitchFamily="34" charset="0"/>
+                <a:cs typeface="Calibri" panose="020F0502020204030204" pitchFamily="34" charset="0"/>
+              </a:rPr>
+              <a:t> </a:t>
+            </a:r>
+            <a:r>
+              <a:rPr lang="en-US" altLang="zh-CN" sz="2400" dirty="0" err="1">
+                <a:solidFill>
+                  <a:srgbClr val="1F2328"/>
+                </a:solidFill>
+                <a:latin typeface="Calibri" panose="020F0502020204030204" pitchFamily="34" charset="0"/>
+                <a:ea typeface="Calibri" panose="020F0502020204030204" pitchFamily="34" charset="0"/>
+                <a:cs typeface="Calibri" panose="020F0502020204030204" pitchFamily="34" charset="0"/>
+              </a:rPr>
+              <a:t>maxlen</a:t>
+            </a:r>
+            <a:r>
+              <a:rPr lang="en-US" altLang="zh-CN" sz="2400" dirty="0">
+                <a:solidFill>
+                  <a:srgbClr val="1F2328"/>
+                </a:solidFill>
+                <a:latin typeface="Calibri" panose="020F0502020204030204" pitchFamily="34" charset="0"/>
+                <a:ea typeface="Calibri" panose="020F0502020204030204" pitchFamily="34" charset="0"/>
+                <a:cs typeface="Calibri" panose="020F0502020204030204" pitchFamily="34" charset="0"/>
+              </a:rPr>
+              <a:t>.</a:t>
             </a:r>
           </a:p>
         </p:txBody>
@@ -5769,39 +5868,10 @@
       </p:grpSpPr>
       <p:sp>
         <p:nvSpPr>
-          <p:cNvPr id="6" name="灯片编号占位符 5">
-            <a:extLst>
-              <a:ext uri="{FF2B5EF4-FFF2-40B4-BE49-F238E27FC236}">
-                <a16:creationId xmlns:a16="http://schemas.microsoft.com/office/drawing/2014/main" id="{064315A4-3CF4-4926-C9FA-2AFFC911ABCF}"/>
-              </a:ext>
-            </a:extLst>
-          </p:cNvPr>
-          <p:cNvSpPr>
-            <a:spLocks noGrp="1"/>
-          </p:cNvSpPr>
-          <p:nvPr>
-            <p:ph type="sldNum" sz="quarter" idx="2"/>
-          </p:nvPr>
-        </p:nvSpPr>
-        <p:spPr/>
-        <p:txBody>
-          <a:bodyPr/>
-          <a:lstStyle/>
-          <a:p>
-            <a:fld id="{86CB4B4D-7CA3-9044-876B-883B54F8677D}" type="slidenum">
-              <a:rPr lang="en-US" altLang="zh-CN" smtClean="0"/>
-              <a:t>7</a:t>
-            </a:fld>
-            <a:endParaRPr lang="zh-CN" altLang="en-US"/>
-          </a:p>
-        </p:txBody>
-      </p:sp>
-      <p:sp>
-        <p:nvSpPr>
-          <p:cNvPr id="5" name="文本框 4">
-            <a:extLst>
-              <a:ext uri="{FF2B5EF4-FFF2-40B4-BE49-F238E27FC236}">
-                <a16:creationId xmlns:a16="http://schemas.microsoft.com/office/drawing/2014/main" id="{845637AD-D55C-9023-2235-DDE9EB1FBEE5}"/>
+          <p:cNvPr id="2" name="文本框 1">
+            <a:extLst>
+              <a:ext uri="{FF2B5EF4-FFF2-40B4-BE49-F238E27FC236}">
+                <a16:creationId xmlns:a16="http://schemas.microsoft.com/office/drawing/2014/main" id="{EBAAE2B9-E83C-DE2D-7425-84D9C58ACF0F}"/>
               </a:ext>
             </a:extLst>
           </p:cNvPr>
@@ -5810,7 +5880,7 @@
         </p:nvSpPr>
         <p:spPr>
           <a:xfrm>
-            <a:off x="242166" y="3153733"/>
+            <a:off x="207442" y="173252"/>
             <a:ext cx="10237011" cy="2308324"/>
           </a:xfrm>
           <a:prstGeom prst="rect">
@@ -5907,10 +5977,10 @@
       </p:sp>
       <p:sp>
         <p:nvSpPr>
-          <p:cNvPr id="7" name="文本框 6">
-            <a:extLst>
-              <a:ext uri="{FF2B5EF4-FFF2-40B4-BE49-F238E27FC236}">
-                <a16:creationId xmlns:a16="http://schemas.microsoft.com/office/drawing/2014/main" id="{B9242670-C6F9-BF95-3E95-0CE829300265}"/>
+          <p:cNvPr id="4" name="文本框 3">
+            <a:extLst>
+              <a:ext uri="{FF2B5EF4-FFF2-40B4-BE49-F238E27FC236}">
+                <a16:creationId xmlns:a16="http://schemas.microsoft.com/office/drawing/2014/main" id="{A310EA5B-76EF-1D33-4623-B9301E14BFAD}"/>
               </a:ext>
             </a:extLst>
           </p:cNvPr>
@@ -5919,8 +5989,8 @@
         </p:nvSpPr>
         <p:spPr>
           <a:xfrm>
-            <a:off x="276345" y="3934205"/>
-            <a:ext cx="9967250" cy="1815882"/>
+            <a:off x="241621" y="953724"/>
+            <a:ext cx="9967250" cy="2246769"/>
           </a:xfrm>
           <a:prstGeom prst="rect">
             <a:avLst/>
@@ -5957,7 +6027,7 @@
                 <a:ea typeface="Calibri" panose="020F0502020204030204" pitchFamily="34" charset="0"/>
                 <a:cs typeface="Calibri" panose="020F0502020204030204" pitchFamily="34" charset="0"/>
               </a:rPr>
-              <a:t>2. Implement other models with the time features.</a:t>
+              <a:t>2. Implement proposed models with the time features.</a:t>
             </a:r>
           </a:p>
           <a:p>
@@ -5974,89 +6044,44 @@
               <a:t>3. Use other models’ generated item embeddings to convince my analysis.</a:t>
             </a:r>
           </a:p>
-        </p:txBody>
-      </p:sp>
-      <p:sp>
-        <p:nvSpPr>
-          <p:cNvPr id="14" name="文本框 13">
-            <a:extLst>
-              <a:ext uri="{FF2B5EF4-FFF2-40B4-BE49-F238E27FC236}">
-                <a16:creationId xmlns:a16="http://schemas.microsoft.com/office/drawing/2014/main" id="{3271A20C-7591-13A5-D0A1-79C29BD46BC7}"/>
-              </a:ext>
-            </a:extLst>
-          </p:cNvPr>
-          <p:cNvSpPr txBox="1"/>
-          <p:nvPr/>
-        </p:nvSpPr>
-        <p:spPr>
-          <a:xfrm>
-            <a:off x="207442" y="288764"/>
-            <a:ext cx="10237011" cy="646331"/>
-          </a:xfrm>
-          <a:prstGeom prst="rect">
-            <a:avLst/>
-          </a:prstGeom>
-          <a:noFill/>
-        </p:spPr>
-        <p:txBody>
-          <a:bodyPr wrap="square">
-            <a:spAutoFit/>
-          </a:bodyPr>
-          <a:lstStyle/>
           <a:p>
             <a:pPr algn="l"/>
             <a:r>
-              <a:rPr lang="en-US" altLang="zh-CN" sz="3600" dirty="0">
+              <a:rPr lang="en-US" altLang="zh-CN" sz="2800" dirty="0">
                 <a:solidFill>
-                  <a:schemeClr val="accent1"/>
+                  <a:srgbClr val="1F2328"/>
                 </a:solidFill>
                 <a:latin typeface="Calibri" panose="020F0502020204030204" pitchFamily="34" charset="0"/>
                 <a:ea typeface="Calibri" panose="020F0502020204030204" pitchFamily="34" charset="0"/>
                 <a:cs typeface="Calibri" panose="020F0502020204030204" pitchFamily="34" charset="0"/>
               </a:rPr>
-              <a:t>Experiment results</a:t>
-            </a:r>
-            <a:endParaRPr lang="en-GB" altLang="zh-CN" dirty="0">
-              <a:solidFill>
-                <a:srgbClr val="1F2328"/>
-              </a:solidFill>
-              <a:latin typeface="Calibri" panose="020F0502020204030204" pitchFamily="34" charset="0"/>
-              <a:ea typeface="Calibri" panose="020F0502020204030204" pitchFamily="34" charset="0"/>
-              <a:cs typeface="Calibri" panose="020F0502020204030204" pitchFamily="34" charset="0"/>
-            </a:endParaRPr>
-          </a:p>
-        </p:txBody>
-      </p:sp>
-      <p:pic>
-        <p:nvPicPr>
-          <p:cNvPr id="3" name="图片 2">
-            <a:extLst>
-              <a:ext uri="{FF2B5EF4-FFF2-40B4-BE49-F238E27FC236}">
-                <a16:creationId xmlns:a16="http://schemas.microsoft.com/office/drawing/2014/main" id="{1C8753B0-2655-1820-61B0-DDC93C642EC6}"/>
-              </a:ext>
-            </a:extLst>
-          </p:cNvPr>
-          <p:cNvPicPr>
-            <a:picLocks noChangeAspect="1"/>
-          </p:cNvPicPr>
-          <p:nvPr/>
-        </p:nvPicPr>
-        <p:blipFill>
-          <a:blip r:embed="rId2"/>
-          <a:stretch>
-            <a:fillRect/>
-          </a:stretch>
-        </p:blipFill>
-        <p:spPr>
-          <a:xfrm>
-            <a:off x="139878" y="960004"/>
-            <a:ext cx="11773505" cy="1803493"/>
-          </a:xfrm>
-          <a:prstGeom prst="rect">
-            <a:avLst/>
-          </a:prstGeom>
-        </p:spPr>
-      </p:pic>
+              <a:t>4.</a:t>
+            </a:r>
+            <a:r>
+              <a:rPr lang="zh-CN" altLang="en-US" sz="2800" dirty="0">
+                <a:solidFill>
+                  <a:srgbClr val="1F2328"/>
+                </a:solidFill>
+                <a:latin typeface="Calibri" panose="020F0502020204030204" pitchFamily="34" charset="0"/>
+                <a:ea typeface="Calibri" panose="020F0502020204030204" pitchFamily="34" charset="0"/>
+                <a:cs typeface="Calibri" panose="020F0502020204030204" pitchFamily="34" charset="0"/>
+              </a:rPr>
+              <a:t> </a:t>
+            </a:r>
+            <a:r>
+              <a:rPr lang="en-US" altLang="zh-CN" sz="2800" dirty="0">
+                <a:solidFill>
+                  <a:srgbClr val="1F2328"/>
+                </a:solidFill>
+                <a:latin typeface="Calibri" panose="020F0502020204030204" pitchFamily="34" charset="0"/>
+                <a:ea typeface="Calibri" panose="020F0502020204030204" pitchFamily="34" charset="0"/>
+                <a:cs typeface="Calibri" panose="020F0502020204030204" pitchFamily="34" charset="0"/>
+              </a:rPr>
+              <a:t>Writing</a:t>
+            </a:r>
+          </a:p>
+        </p:txBody>
+      </p:sp>
     </p:spTree>
     <p:extLst>
       <p:ext uri="{BB962C8B-B14F-4D97-AF65-F5344CB8AC3E}">

</xml_diff>